<commit_message>
Update Agile Software Engineering presentation file
</commit_message>
<xml_diff>
--- a/learning_material/Agile Software Engineering.pptx
+++ b/learning_material/Agile Software Engineering.pptx
@@ -5,7 +5,7 @@
     <p:sldMasterId id="2147483648" r:id="rId1"/>
   </p:sldMasterIdLst>
   <p:notesMasterIdLst>
-    <p:notesMasterId r:id="rId24"/>
+    <p:notesMasterId r:id="rId25"/>
   </p:notesMasterIdLst>
   <p:sldIdLst>
     <p:sldId id="256" r:id="rId2"/>
@@ -30,6 +30,7 @@
     <p:sldId id="3220" r:id="rId21"/>
     <p:sldId id="3289" r:id="rId22"/>
     <p:sldId id="3290" r:id="rId23"/>
+    <p:sldId id="3292" r:id="rId24"/>
   </p:sldIdLst>
   <p:sldSz cx="12192000" cy="6858000"/>
   <p:notesSz cx="6858000" cy="9144000"/>
@@ -149,7 +150,7 @@
   <pc:docChgLst>
     <pc:chgData name="Heitor Roriz Filho" userId="af4ef8844a2fcbc3" providerId="LiveId" clId="{173FCC4A-857D-48E8-A663-6F33560BDDC5}"/>
     <pc:docChg chg="undo custSel addSld delSld modSld">
-      <pc:chgData name="Heitor Roriz Filho" userId="af4ef8844a2fcbc3" providerId="LiveId" clId="{173FCC4A-857D-48E8-A663-6F33560BDDC5}" dt="2025-09-22T02:10:57.947" v="1544" actId="13926"/>
+      <pc:chgData name="Heitor Roriz Filho" userId="af4ef8844a2fcbc3" providerId="LiveId" clId="{173FCC4A-857D-48E8-A663-6F33560BDDC5}" dt="2025-09-22T11:51:37.907" v="1560" actId="20577"/>
       <pc:docMkLst>
         <pc:docMk/>
       </pc:docMkLst>
@@ -1809,6 +1810,37 @@
           </ac:spMkLst>
         </pc:spChg>
       </pc:sldChg>
+      <pc:sldChg chg="addSp delSp modSp new mod">
+        <pc:chgData name="Heitor Roriz Filho" userId="af4ef8844a2fcbc3" providerId="LiveId" clId="{173FCC4A-857D-48E8-A663-6F33560BDDC5}" dt="2025-09-22T11:51:37.907" v="1560" actId="20577"/>
+        <pc:sldMkLst>
+          <pc:docMk/>
+          <pc:sldMk cId="1674465491" sldId="3292"/>
+        </pc:sldMkLst>
+        <pc:spChg chg="del">
+          <ac:chgData name="Heitor Roriz Filho" userId="af4ef8844a2fcbc3" providerId="LiveId" clId="{173FCC4A-857D-48E8-A663-6F33560BDDC5}" dt="2025-09-22T11:50:51.166" v="1546" actId="478"/>
+          <ac:spMkLst>
+            <pc:docMk/>
+            <pc:sldMk cId="1674465491" sldId="3292"/>
+            <ac:spMk id="2" creationId="{CF312228-075C-B5A0-E335-189B1C51DBB4}"/>
+          </ac:spMkLst>
+        </pc:spChg>
+        <pc:spChg chg="del">
+          <ac:chgData name="Heitor Roriz Filho" userId="af4ef8844a2fcbc3" providerId="LiveId" clId="{173FCC4A-857D-48E8-A663-6F33560BDDC5}" dt="2025-09-22T11:50:51.166" v="1546" actId="478"/>
+          <ac:spMkLst>
+            <pc:docMk/>
+            <pc:sldMk cId="1674465491" sldId="3292"/>
+            <ac:spMk id="3" creationId="{378E4A8C-FBE2-C60E-0273-AA07374FCDF5}"/>
+          </ac:spMkLst>
+        </pc:spChg>
+        <pc:spChg chg="add mod">
+          <ac:chgData name="Heitor Roriz Filho" userId="af4ef8844a2fcbc3" providerId="LiveId" clId="{173FCC4A-857D-48E8-A663-6F33560BDDC5}" dt="2025-09-22T11:51:37.907" v="1560" actId="20577"/>
+          <ac:spMkLst>
+            <pc:docMk/>
+            <pc:sldMk cId="1674465491" sldId="3292"/>
+            <ac:spMk id="5" creationId="{8851E74D-8744-9583-C723-0BB59224B478}"/>
+          </ac:spMkLst>
+        </pc:spChg>
+      </pc:sldChg>
     </pc:docChg>
   </pc:docChgLst>
 </pc:chgInfo>
@@ -1896,7 +1928,7 @@
           <a:p>
             <a:fld id="{46B922E6-F63C-408A-A7A3-C8E767458CC8}" type="datetimeFigureOut">
               <a:rPr lang="pt-BR" smtClean="0"/>
-              <a:t>21/09/2025</a:t>
+              <a:t>22/09/2025</a:t>
             </a:fld>
             <a:endParaRPr lang="pt-BR"/>
           </a:p>
@@ -3015,7 +3047,7 @@
           <a:p>
             <a:fld id="{249725DE-7C86-48DA-AE7F-5CC07460A36C}" type="datetimeFigureOut">
               <a:rPr lang="pt-BR" smtClean="0"/>
-              <a:t>21/09/2025</a:t>
+              <a:t>22/09/2025</a:t>
             </a:fld>
             <a:endParaRPr lang="pt-BR"/>
           </a:p>
@@ -3215,7 +3247,7 @@
           <a:p>
             <a:fld id="{249725DE-7C86-48DA-AE7F-5CC07460A36C}" type="datetimeFigureOut">
               <a:rPr lang="pt-BR" smtClean="0"/>
-              <a:t>21/09/2025</a:t>
+              <a:t>22/09/2025</a:t>
             </a:fld>
             <a:endParaRPr lang="pt-BR"/>
           </a:p>
@@ -3425,7 +3457,7 @@
           <a:p>
             <a:fld id="{249725DE-7C86-48DA-AE7F-5CC07460A36C}" type="datetimeFigureOut">
               <a:rPr lang="pt-BR" smtClean="0"/>
-              <a:t>21/09/2025</a:t>
+              <a:t>22/09/2025</a:t>
             </a:fld>
             <a:endParaRPr lang="pt-BR"/>
           </a:p>
@@ -3625,7 +3657,7 @@
           <a:p>
             <a:fld id="{249725DE-7C86-48DA-AE7F-5CC07460A36C}" type="datetimeFigureOut">
               <a:rPr lang="pt-BR" smtClean="0"/>
-              <a:t>21/09/2025</a:t>
+              <a:t>22/09/2025</a:t>
             </a:fld>
             <a:endParaRPr lang="pt-BR"/>
           </a:p>
@@ -3901,7 +3933,7 @@
           <a:p>
             <a:fld id="{249725DE-7C86-48DA-AE7F-5CC07460A36C}" type="datetimeFigureOut">
               <a:rPr lang="pt-BR" smtClean="0"/>
-              <a:t>21/09/2025</a:t>
+              <a:t>22/09/2025</a:t>
             </a:fld>
             <a:endParaRPr lang="pt-BR"/>
           </a:p>
@@ -4169,7 +4201,7 @@
           <a:p>
             <a:fld id="{249725DE-7C86-48DA-AE7F-5CC07460A36C}" type="datetimeFigureOut">
               <a:rPr lang="pt-BR" smtClean="0"/>
-              <a:t>21/09/2025</a:t>
+              <a:t>22/09/2025</a:t>
             </a:fld>
             <a:endParaRPr lang="pt-BR"/>
           </a:p>
@@ -4584,7 +4616,7 @@
           <a:p>
             <a:fld id="{249725DE-7C86-48DA-AE7F-5CC07460A36C}" type="datetimeFigureOut">
               <a:rPr lang="pt-BR" smtClean="0"/>
-              <a:t>21/09/2025</a:t>
+              <a:t>22/09/2025</a:t>
             </a:fld>
             <a:endParaRPr lang="pt-BR"/>
           </a:p>
@@ -4726,7 +4758,7 @@
           <a:p>
             <a:fld id="{249725DE-7C86-48DA-AE7F-5CC07460A36C}" type="datetimeFigureOut">
               <a:rPr lang="pt-BR" smtClean="0"/>
-              <a:t>21/09/2025</a:t>
+              <a:t>22/09/2025</a:t>
             </a:fld>
             <a:endParaRPr lang="pt-BR"/>
           </a:p>
@@ -4839,7 +4871,7 @@
           <a:p>
             <a:fld id="{249725DE-7C86-48DA-AE7F-5CC07460A36C}" type="datetimeFigureOut">
               <a:rPr lang="pt-BR" smtClean="0"/>
-              <a:t>21/09/2025</a:t>
+              <a:t>22/09/2025</a:t>
             </a:fld>
             <a:endParaRPr lang="pt-BR"/>
           </a:p>
@@ -5152,7 +5184,7 @@
           <a:p>
             <a:fld id="{249725DE-7C86-48DA-AE7F-5CC07460A36C}" type="datetimeFigureOut">
               <a:rPr lang="pt-BR" smtClean="0"/>
-              <a:t>21/09/2025</a:t>
+              <a:t>22/09/2025</a:t>
             </a:fld>
             <a:endParaRPr lang="pt-BR"/>
           </a:p>
@@ -5441,7 +5473,7 @@
           <a:p>
             <a:fld id="{249725DE-7C86-48DA-AE7F-5CC07460A36C}" type="datetimeFigureOut">
               <a:rPr lang="pt-BR" smtClean="0"/>
-              <a:t>21/09/2025</a:t>
+              <a:t>22/09/2025</a:t>
             </a:fld>
             <a:endParaRPr lang="pt-BR"/>
           </a:p>
@@ -5684,7 +5716,7 @@
           <a:p>
             <a:fld id="{249725DE-7C86-48DA-AE7F-5CC07460A36C}" type="datetimeFigureOut">
               <a:rPr lang="pt-BR" smtClean="0"/>
-              <a:t>21/09/2025</a:t>
+              <a:t>22/09/2025</a:t>
             </a:fld>
             <a:endParaRPr lang="pt-BR"/>
           </a:p>
@@ -12481,7 +12513,7 @@
           </a:ln>
           <a:extLst>
             <a:ext uri="{C572A759-6A51-4108-AA02-DFA0A04FC94B}">
-              <ma14:wrappingTextBoxFlag xmlns:ma14="http://schemas.microsoft.com/office/mac/drawingml/2011/main" xmlns="" val="1"/>
+              <ma14:wrappingTextBoxFlag xmlns="" xmlns:ma14="http://schemas.microsoft.com/office/mac/drawingml/2011/main" val="1"/>
             </a:ext>
           </a:extLst>
         </p:spPr>
@@ -12533,7 +12565,7 @@
           </a:ln>
           <a:extLst>
             <a:ext uri="{C572A759-6A51-4108-AA02-DFA0A04FC94B}">
-              <ma14:wrappingTextBoxFlag xmlns:ma14="http://schemas.microsoft.com/office/mac/drawingml/2011/main" xmlns="" val="1"/>
+              <ma14:wrappingTextBoxFlag xmlns="" xmlns:ma14="http://schemas.microsoft.com/office/mac/drawingml/2011/main" val="1"/>
             </a:ext>
           </a:extLst>
         </p:spPr>
@@ -12634,7 +12666,7 @@
           </a:ln>
           <a:extLst>
             <a:ext uri="{C572A759-6A51-4108-AA02-DFA0A04FC94B}">
-              <ma14:wrappingTextBoxFlag xmlns:ma14="http://schemas.microsoft.com/office/mac/drawingml/2011/main" xmlns="" val="1"/>
+              <ma14:wrappingTextBoxFlag xmlns="" xmlns:ma14="http://schemas.microsoft.com/office/mac/drawingml/2011/main" val="1"/>
             </a:ext>
           </a:extLst>
         </p:spPr>
@@ -12685,7 +12717,7 @@
           </a:ln>
           <a:extLst>
             <a:ext uri="{C572A759-6A51-4108-AA02-DFA0A04FC94B}">
-              <ma14:wrappingTextBoxFlag xmlns:ma14="http://schemas.microsoft.com/office/mac/drawingml/2011/main" xmlns="" val="1"/>
+              <ma14:wrappingTextBoxFlag xmlns="" xmlns:ma14="http://schemas.microsoft.com/office/mac/drawingml/2011/main" val="1"/>
             </a:ext>
           </a:extLst>
         </p:spPr>
@@ -12750,7 +12782,7 @@
           </a:ln>
           <a:extLst>
             <a:ext uri="{C572A759-6A51-4108-AA02-DFA0A04FC94B}">
-              <ma14:wrappingTextBoxFlag xmlns:ma14="http://schemas.microsoft.com/office/mac/drawingml/2011/main" xmlns="" val="1"/>
+              <ma14:wrappingTextBoxFlag xmlns="" xmlns:ma14="http://schemas.microsoft.com/office/mac/drawingml/2011/main" val="1"/>
             </a:ext>
           </a:extLst>
         </p:spPr>
@@ -12802,7 +12834,7 @@
           </a:ln>
           <a:extLst>
             <a:ext uri="{C572A759-6A51-4108-AA02-DFA0A04FC94B}">
-              <ma14:wrappingTextBoxFlag xmlns:ma14="http://schemas.microsoft.com/office/mac/drawingml/2011/main" xmlns="" val="1"/>
+              <ma14:wrappingTextBoxFlag xmlns="" xmlns:ma14="http://schemas.microsoft.com/office/mac/drawingml/2011/main" val="1"/>
             </a:ext>
           </a:extLst>
         </p:spPr>
@@ -12852,7 +12884,7 @@
           </a:ln>
           <a:extLst>
             <a:ext uri="{C572A759-6A51-4108-AA02-DFA0A04FC94B}">
-              <ma14:wrappingTextBoxFlag xmlns:ma14="http://schemas.microsoft.com/office/mac/drawingml/2011/main" xmlns="" val="1"/>
+              <ma14:wrappingTextBoxFlag xmlns="" xmlns:ma14="http://schemas.microsoft.com/office/mac/drawingml/2011/main" val="1"/>
             </a:ext>
           </a:extLst>
         </p:spPr>
@@ -12902,7 +12934,7 @@
           </a:ln>
           <a:extLst>
             <a:ext uri="{C572A759-6A51-4108-AA02-DFA0A04FC94B}">
-              <ma14:wrappingTextBoxFlag xmlns:ma14="http://schemas.microsoft.com/office/mac/drawingml/2011/main" xmlns="" val="1"/>
+              <ma14:wrappingTextBoxFlag xmlns="" xmlns:ma14="http://schemas.microsoft.com/office/mac/drawingml/2011/main" val="1"/>
             </a:ext>
           </a:extLst>
         </p:spPr>
@@ -12952,7 +12984,7 @@
           </a:ln>
           <a:extLst>
             <a:ext uri="{C572A759-6A51-4108-AA02-DFA0A04FC94B}">
-              <ma14:wrappingTextBoxFlag xmlns:ma14="http://schemas.microsoft.com/office/mac/drawingml/2011/main" xmlns="" val="1"/>
+              <ma14:wrappingTextBoxFlag xmlns="" xmlns:ma14="http://schemas.microsoft.com/office/mac/drawingml/2011/main" val="1"/>
             </a:ext>
           </a:extLst>
         </p:spPr>
@@ -13037,7 +13069,7 @@
           </a:ln>
           <a:extLst>
             <a:ext uri="{C572A759-6A51-4108-AA02-DFA0A04FC94B}">
-              <ma14:wrappingTextBoxFlag xmlns:ma14="http://schemas.microsoft.com/office/mac/drawingml/2011/main" xmlns="" val="1"/>
+              <ma14:wrappingTextBoxFlag xmlns="" xmlns:ma14="http://schemas.microsoft.com/office/mac/drawingml/2011/main" val="1"/>
             </a:ext>
           </a:extLst>
         </p:spPr>
@@ -22404,6 +22436,104 @@
 </p:sld>
 </file>
 
+<file path=ppt/slides/slide23.xml><?xml version="1.0" encoding="utf-8"?>
+<p:sld xmlns:a="http://schemas.openxmlformats.org/drawingml/2006/main" xmlns:r="http://schemas.openxmlformats.org/officeDocument/2006/relationships" xmlns:p="http://schemas.openxmlformats.org/presentationml/2006/main">
+  <p:cSld>
+    <p:spTree>
+      <p:nvGrpSpPr>
+        <p:cNvPr id="1" name=""/>
+        <p:cNvGrpSpPr/>
+        <p:nvPr/>
+      </p:nvGrpSpPr>
+      <p:grpSpPr>
+        <a:xfrm>
+          <a:off x="0" y="0"/>
+          <a:ext cx="0" cy="0"/>
+          <a:chOff x="0" y="0"/>
+          <a:chExt cx="0" cy="0"/>
+        </a:xfrm>
+      </p:grpSpPr>
+      <p:sp>
+        <p:nvSpPr>
+          <p:cNvPr id="5" name="Textfeld 4">
+            <a:extLst>
+              <a:ext uri="{FF2B5EF4-FFF2-40B4-BE49-F238E27FC236}">
+                <a16:creationId xmlns:a16="http://schemas.microsoft.com/office/drawing/2014/main" id="{8851E74D-8744-9583-C723-0BB59224B478}"/>
+              </a:ext>
+            </a:extLst>
+          </p:cNvPr>
+          <p:cNvSpPr txBox="1"/>
+          <p:nvPr/>
+        </p:nvSpPr>
+        <p:spPr>
+          <a:xfrm>
+            <a:off x="2199195" y="2099523"/>
+            <a:ext cx="7793610" cy="2800767"/>
+          </a:xfrm>
+          <a:prstGeom prst="rect">
+            <a:avLst/>
+          </a:prstGeom>
+          <a:noFill/>
+        </p:spPr>
+        <p:txBody>
+          <a:bodyPr wrap="square">
+            <a:spAutoFit/>
+          </a:bodyPr>
+          <a:lstStyle/>
+          <a:p>
+            <a:r>
+              <a:rPr lang="en-US" sz="4400" dirty="0">
+                <a:highlight>
+                  <a:srgbClr val="00FFFF"/>
+                </a:highlight>
+              </a:rPr>
+              <a:t>Agile and AI </a:t>
+            </a:r>
+            <a:r>
+              <a:rPr lang="en-US" sz="4400" dirty="0"/>
+              <a:t>give us speed. </a:t>
+            </a:r>
+            <a:r>
+              <a:rPr lang="en-US" sz="4400" dirty="0">
+                <a:highlight>
+                  <a:srgbClr val="00FFFF"/>
+                </a:highlight>
+              </a:rPr>
+              <a:t>Engineering</a:t>
+            </a:r>
+            <a:r>
+              <a:rPr lang="en-US" sz="4400" dirty="0"/>
+              <a:t> gives us trust. Together, they shape the </a:t>
+            </a:r>
+            <a:r>
+              <a:rPr lang="en-US" sz="4400" dirty="0">
+                <a:highlight>
+                  <a:srgbClr val="FFFF00"/>
+                </a:highlight>
+              </a:rPr>
+              <a:t>future of software.</a:t>
+            </a:r>
+            <a:endParaRPr lang="pt-BR" sz="4400" dirty="0">
+              <a:highlight>
+                <a:srgbClr val="FFFF00"/>
+              </a:highlight>
+            </a:endParaRPr>
+          </a:p>
+        </p:txBody>
+      </p:sp>
+    </p:spTree>
+    <p:extLst>
+      <p:ext uri="{BB962C8B-B14F-4D97-AF65-F5344CB8AC3E}">
+        <p14:creationId xmlns:p14="http://schemas.microsoft.com/office/powerpoint/2010/main" val="1674465491"/>
+      </p:ext>
+    </p:extLst>
+  </p:cSld>
+  <p:clrMapOvr>
+    <a:masterClrMapping/>
+  </p:clrMapOvr>
+</p:sld>
+</file>
+
 <file path=ppt/slides/slide3.xml><?xml version="1.0" encoding="utf-8"?>
 <p:sld xmlns:a="http://schemas.openxmlformats.org/drawingml/2006/main" xmlns:r="http://schemas.openxmlformats.org/officeDocument/2006/relationships" xmlns:p="http://schemas.openxmlformats.org/presentationml/2006/main">
   <p:cSld>

</xml_diff>